<commit_message>
Setting UI for Buildings
</commit_message>
<xml_diff>
--- a/Industrial Revolution/Industrial Revolution - Image Files/Industrial Revolution - Image Initializer.pptx
+++ b/Industrial Revolution/Industrial Revolution - Image Files/Industrial Revolution - Image Initializer.pptx
@@ -243,7 +243,7 @@
           <a:p>
             <a:fld id="{B6D6A155-47A8-468A-A74D-B48DEA3014CE}" type="datetimeFigureOut">
               <a:rPr lang="en-US" smtClean="0"/>
-              <a:t>1/4/2023</a:t>
+              <a:t>1/5/2023</a:t>
             </a:fld>
             <a:endParaRPr lang="en-US"/>
           </a:p>
@@ -413,7 +413,7 @@
           <a:p>
             <a:fld id="{B6D6A155-47A8-468A-A74D-B48DEA3014CE}" type="datetimeFigureOut">
               <a:rPr lang="en-US" smtClean="0"/>
-              <a:t>1/4/2023</a:t>
+              <a:t>1/5/2023</a:t>
             </a:fld>
             <a:endParaRPr lang="en-US"/>
           </a:p>
@@ -593,7 +593,7 @@
           <a:p>
             <a:fld id="{B6D6A155-47A8-468A-A74D-B48DEA3014CE}" type="datetimeFigureOut">
               <a:rPr lang="en-US" smtClean="0"/>
-              <a:t>1/4/2023</a:t>
+              <a:t>1/5/2023</a:t>
             </a:fld>
             <a:endParaRPr lang="en-US"/>
           </a:p>
@@ -763,7 +763,7 @@
           <a:p>
             <a:fld id="{B6D6A155-47A8-468A-A74D-B48DEA3014CE}" type="datetimeFigureOut">
               <a:rPr lang="en-US" smtClean="0"/>
-              <a:t>1/4/2023</a:t>
+              <a:t>1/5/2023</a:t>
             </a:fld>
             <a:endParaRPr lang="en-US"/>
           </a:p>
@@ -1009,7 +1009,7 @@
           <a:p>
             <a:fld id="{B6D6A155-47A8-468A-A74D-B48DEA3014CE}" type="datetimeFigureOut">
               <a:rPr lang="en-US" smtClean="0"/>
-              <a:t>1/4/2023</a:t>
+              <a:t>1/5/2023</a:t>
             </a:fld>
             <a:endParaRPr lang="en-US"/>
           </a:p>
@@ -1241,7 +1241,7 @@
           <a:p>
             <a:fld id="{B6D6A155-47A8-468A-A74D-B48DEA3014CE}" type="datetimeFigureOut">
               <a:rPr lang="en-US" smtClean="0"/>
-              <a:t>1/4/2023</a:t>
+              <a:t>1/5/2023</a:t>
             </a:fld>
             <a:endParaRPr lang="en-US"/>
           </a:p>
@@ -1608,7 +1608,7 @@
           <a:p>
             <a:fld id="{B6D6A155-47A8-468A-A74D-B48DEA3014CE}" type="datetimeFigureOut">
               <a:rPr lang="en-US" smtClean="0"/>
-              <a:t>1/4/2023</a:t>
+              <a:t>1/5/2023</a:t>
             </a:fld>
             <a:endParaRPr lang="en-US"/>
           </a:p>
@@ -1726,7 +1726,7 @@
           <a:p>
             <a:fld id="{B6D6A155-47A8-468A-A74D-B48DEA3014CE}" type="datetimeFigureOut">
               <a:rPr lang="en-US" smtClean="0"/>
-              <a:t>1/4/2023</a:t>
+              <a:t>1/5/2023</a:t>
             </a:fld>
             <a:endParaRPr lang="en-US"/>
           </a:p>
@@ -1821,7 +1821,7 @@
           <a:p>
             <a:fld id="{B6D6A155-47A8-468A-A74D-B48DEA3014CE}" type="datetimeFigureOut">
               <a:rPr lang="en-US" smtClean="0"/>
-              <a:t>1/4/2023</a:t>
+              <a:t>1/5/2023</a:t>
             </a:fld>
             <a:endParaRPr lang="en-US"/>
           </a:p>
@@ -2098,7 +2098,7 @@
           <a:p>
             <a:fld id="{B6D6A155-47A8-468A-A74D-B48DEA3014CE}" type="datetimeFigureOut">
               <a:rPr lang="en-US" smtClean="0"/>
-              <a:t>1/4/2023</a:t>
+              <a:t>1/5/2023</a:t>
             </a:fld>
             <a:endParaRPr lang="en-US"/>
           </a:p>
@@ -2351,7 +2351,7 @@
           <a:p>
             <a:fld id="{B6D6A155-47A8-468A-A74D-B48DEA3014CE}" type="datetimeFigureOut">
               <a:rPr lang="en-US" smtClean="0"/>
-              <a:t>1/4/2023</a:t>
+              <a:t>1/5/2023</a:t>
             </a:fld>
             <a:endParaRPr lang="en-US"/>
           </a:p>
@@ -2564,7 +2564,7 @@
           <a:p>
             <a:fld id="{B6D6A155-47A8-468A-A74D-B48DEA3014CE}" type="datetimeFigureOut">
               <a:rPr lang="en-US" smtClean="0"/>
-              <a:t>1/4/2023</a:t>
+              <a:t>1/5/2023</a:t>
             </a:fld>
             <a:endParaRPr lang="en-US"/>
           </a:p>
@@ -9842,6 +9842,502 @@
           </p:txBody>
         </p:sp>
       </p:grpSp>
+      <p:grpSp>
+        <p:nvGrpSpPr>
+          <p:cNvPr id="77" name="Group 76"/>
+          <p:cNvGrpSpPr/>
+          <p:nvPr/>
+        </p:nvGrpSpPr>
+        <p:grpSpPr>
+          <a:xfrm>
+            <a:off x="8966655" y="2823101"/>
+            <a:ext cx="361602" cy="658724"/>
+            <a:chOff x="8966655" y="2823101"/>
+            <a:chExt cx="361602" cy="658724"/>
+          </a:xfrm>
+        </p:grpSpPr>
+        <p:sp>
+          <p:nvSpPr>
+            <p:cNvPr id="29" name="Isosceles Triangle 28"/>
+            <p:cNvSpPr/>
+            <p:nvPr/>
+          </p:nvSpPr>
+          <p:spPr>
+            <a:xfrm>
+              <a:off x="8966655" y="2946287"/>
+              <a:ext cx="361602" cy="535538"/>
+            </a:xfrm>
+            <a:custGeom>
+              <a:avLst/>
+              <a:gdLst>
+                <a:gd name="connsiteX0" fmla="*/ 0 w 902627"/>
+                <a:gd name="connsiteY0" fmla="*/ 1091775 h 1091775"/>
+                <a:gd name="connsiteX1" fmla="*/ 451314 w 902627"/>
+                <a:gd name="connsiteY1" fmla="*/ 0 h 1091775"/>
+                <a:gd name="connsiteX2" fmla="*/ 902627 w 902627"/>
+                <a:gd name="connsiteY2" fmla="*/ 1091775 h 1091775"/>
+                <a:gd name="connsiteX3" fmla="*/ 0 w 902627"/>
+                <a:gd name="connsiteY3" fmla="*/ 1091775 h 1091775"/>
+                <a:gd name="connsiteX0" fmla="*/ 0 w 912463"/>
+                <a:gd name="connsiteY0" fmla="*/ 1091775 h 1228246"/>
+                <a:gd name="connsiteX1" fmla="*/ 451314 w 912463"/>
+                <a:gd name="connsiteY1" fmla="*/ 0 h 1228246"/>
+                <a:gd name="connsiteX2" fmla="*/ 902627 w 912463"/>
+                <a:gd name="connsiteY2" fmla="*/ 1091775 h 1228246"/>
+                <a:gd name="connsiteX3" fmla="*/ 0 w 912463"/>
+                <a:gd name="connsiteY3" fmla="*/ 1091775 h 1228246"/>
+                <a:gd name="connsiteX0" fmla="*/ 9836 w 922299"/>
+                <a:gd name="connsiteY0" fmla="*/ 1091775 h 1228246"/>
+                <a:gd name="connsiteX1" fmla="*/ 461150 w 922299"/>
+                <a:gd name="connsiteY1" fmla="*/ 0 h 1228246"/>
+                <a:gd name="connsiteX2" fmla="*/ 912463 w 922299"/>
+                <a:gd name="connsiteY2" fmla="*/ 1091775 h 1228246"/>
+                <a:gd name="connsiteX3" fmla="*/ 9836 w 922299"/>
+                <a:gd name="connsiteY3" fmla="*/ 1091775 h 1228246"/>
+                <a:gd name="connsiteX0" fmla="*/ 10312 w 922316"/>
+                <a:gd name="connsiteY0" fmla="*/ 1444976 h 1625597"/>
+                <a:gd name="connsiteX1" fmla="*/ 453777 w 922316"/>
+                <a:gd name="connsiteY1" fmla="*/ 0 h 1625597"/>
+                <a:gd name="connsiteX2" fmla="*/ 912939 w 922316"/>
+                <a:gd name="connsiteY2" fmla="*/ 1444976 h 1625597"/>
+                <a:gd name="connsiteX3" fmla="*/ 10312 w 922316"/>
+                <a:gd name="connsiteY3" fmla="*/ 1444976 h 1625597"/>
+                <a:gd name="connsiteX0" fmla="*/ 12775 w 838438"/>
+                <a:gd name="connsiteY0" fmla="*/ 1426896 h 1615641"/>
+                <a:gd name="connsiteX1" fmla="*/ 372739 w 838438"/>
+                <a:gd name="connsiteY1" fmla="*/ 0 h 1615641"/>
+                <a:gd name="connsiteX2" fmla="*/ 831901 w 838438"/>
+                <a:gd name="connsiteY2" fmla="*/ 1444976 h 1615641"/>
+                <a:gd name="connsiteX3" fmla="*/ 12775 w 838438"/>
+                <a:gd name="connsiteY3" fmla="*/ 1426896 h 1615641"/>
+                <a:gd name="connsiteX0" fmla="*/ 9991 w 772609"/>
+                <a:gd name="connsiteY0" fmla="*/ 1426896 h 1610396"/>
+                <a:gd name="connsiteX1" fmla="*/ 369955 w 772609"/>
+                <a:gd name="connsiteY1" fmla="*/ 0 h 1610396"/>
+                <a:gd name="connsiteX2" fmla="*/ 764886 w 772609"/>
+                <a:gd name="connsiteY2" fmla="*/ 1435937 h 1610396"/>
+                <a:gd name="connsiteX3" fmla="*/ 9991 w 772609"/>
+                <a:gd name="connsiteY3" fmla="*/ 1426896 h 1610396"/>
+              </a:gdLst>
+              <a:ahLst/>
+              <a:cxnLst>
+                <a:cxn ang="0">
+                  <a:pos x="connsiteX0" y="connsiteY0"/>
+                </a:cxn>
+                <a:cxn ang="0">
+                  <a:pos x="connsiteX1" y="connsiteY1"/>
+                </a:cxn>
+                <a:cxn ang="0">
+                  <a:pos x="connsiteX2" y="connsiteY2"/>
+                </a:cxn>
+                <a:cxn ang="0">
+                  <a:pos x="connsiteX3" y="connsiteY3"/>
+                </a:cxn>
+              </a:cxnLst>
+              <a:rect l="l" t="t" r="r" b="b"/>
+              <a:pathLst>
+                <a:path w="772609" h="1610396">
+                  <a:moveTo>
+                    <a:pt x="9991" y="1426896"/>
+                  </a:moveTo>
+                  <a:cubicBezTo>
+                    <a:pt x="-55831" y="1187573"/>
+                    <a:pt x="219517" y="0"/>
+                    <a:pt x="369955" y="0"/>
+                  </a:cubicBezTo>
+                  <a:cubicBezTo>
+                    <a:pt x="520393" y="0"/>
+                    <a:pt x="824880" y="1198121"/>
+                    <a:pt x="764886" y="1435937"/>
+                  </a:cubicBezTo>
+                  <a:cubicBezTo>
+                    <a:pt x="704892" y="1673753"/>
+                    <a:pt x="75813" y="1666219"/>
+                    <a:pt x="9991" y="1426896"/>
+                  </a:cubicBezTo>
+                  <a:close/>
+                </a:path>
+              </a:pathLst>
+            </a:custGeom>
+            <a:solidFill>
+              <a:schemeClr val="bg2">
+                <a:lumMod val="50000"/>
+              </a:schemeClr>
+            </a:solidFill>
+            <a:ln w="28575">
+              <a:solidFill>
+                <a:schemeClr val="tx1"/>
+              </a:solidFill>
+            </a:ln>
+          </p:spPr>
+          <p:style>
+            <a:lnRef idx="2">
+              <a:schemeClr val="accent1">
+                <a:shade val="50000"/>
+              </a:schemeClr>
+            </a:lnRef>
+            <a:fillRef idx="1">
+              <a:schemeClr val="accent1"/>
+            </a:fillRef>
+            <a:effectRef idx="0">
+              <a:schemeClr val="accent1"/>
+            </a:effectRef>
+            <a:fontRef idx="minor">
+              <a:schemeClr val="lt1"/>
+            </a:fontRef>
+          </p:style>
+          <p:txBody>
+            <a:bodyPr rtlCol="0" anchor="ctr"/>
+            <a:lstStyle/>
+            <a:p>
+              <a:pPr algn="ctr"/>
+              <a:endParaRPr lang="en-US"/>
+            </a:p>
+          </p:txBody>
+        </p:sp>
+        <p:sp>
+          <p:nvSpPr>
+            <p:cNvPr id="76" name="Oval 75"/>
+            <p:cNvSpPr/>
+            <p:nvPr/>
+          </p:nvSpPr>
+          <p:spPr>
+            <a:xfrm>
+              <a:off x="9010296" y="2823101"/>
+              <a:ext cx="274320" cy="274320"/>
+            </a:xfrm>
+            <a:prstGeom prst="ellipse">
+              <a:avLst/>
+            </a:prstGeom>
+            <a:solidFill>
+              <a:srgbClr val="FFDBAC"/>
+            </a:solidFill>
+            <a:ln w="28575">
+              <a:solidFill>
+                <a:srgbClr val="F1C27D"/>
+              </a:solidFill>
+            </a:ln>
+          </p:spPr>
+          <p:style>
+            <a:lnRef idx="2">
+              <a:schemeClr val="accent1">
+                <a:shade val="50000"/>
+              </a:schemeClr>
+            </a:lnRef>
+            <a:fillRef idx="1">
+              <a:schemeClr val="accent1"/>
+            </a:fillRef>
+            <a:effectRef idx="0">
+              <a:schemeClr val="accent1"/>
+            </a:effectRef>
+            <a:fontRef idx="minor">
+              <a:schemeClr val="lt1"/>
+            </a:fontRef>
+          </p:style>
+          <p:txBody>
+            <a:bodyPr rtlCol="0" anchor="ctr"/>
+            <a:lstStyle/>
+            <a:p>
+              <a:pPr algn="ctr"/>
+              <a:endParaRPr lang="en-US" sz="1100" b="1" dirty="0"/>
+            </a:p>
+          </p:txBody>
+        </p:sp>
+        <p:sp>
+          <p:nvSpPr>
+            <p:cNvPr id="78" name="Freeform 77"/>
+            <p:cNvSpPr/>
+            <p:nvPr/>
+          </p:nvSpPr>
+          <p:spPr>
+            <a:xfrm>
+              <a:off x="9051033" y="3315549"/>
+              <a:ext cx="77762" cy="55122"/>
+            </a:xfrm>
+            <a:custGeom>
+              <a:avLst/>
+              <a:gdLst>
+                <a:gd name="connsiteX0" fmla="*/ 78489 w 698555"/>
+                <a:gd name="connsiteY0" fmla="*/ 82414 h 482709"/>
+                <a:gd name="connsiteX1" fmla="*/ 290410 w 698555"/>
+                <a:gd name="connsiteY1" fmla="*/ 0 h 482709"/>
+                <a:gd name="connsiteX2" fmla="*/ 620065 w 698555"/>
+                <a:gd name="connsiteY2" fmla="*/ 43169 h 482709"/>
+                <a:gd name="connsiteX3" fmla="*/ 698555 w 698555"/>
+                <a:gd name="connsiteY3" fmla="*/ 310032 h 482709"/>
+                <a:gd name="connsiteX4" fmla="*/ 510180 w 698555"/>
+                <a:gd name="connsiteY4" fmla="*/ 482709 h 482709"/>
+                <a:gd name="connsiteX5" fmla="*/ 0 w 698555"/>
+                <a:gd name="connsiteY5" fmla="*/ 353202 h 482709"/>
+                <a:gd name="connsiteX6" fmla="*/ 51018 w 698555"/>
+                <a:gd name="connsiteY6" fmla="*/ 306108 h 482709"/>
+                <a:gd name="connsiteX7" fmla="*/ 78489 w 698555"/>
+                <a:gd name="connsiteY7" fmla="*/ 82414 h 482709"/>
+                <a:gd name="connsiteX0" fmla="*/ 78489 w 698555"/>
+                <a:gd name="connsiteY0" fmla="*/ 82414 h 482709"/>
+                <a:gd name="connsiteX1" fmla="*/ 290410 w 698555"/>
+                <a:gd name="connsiteY1" fmla="*/ 0 h 482709"/>
+                <a:gd name="connsiteX2" fmla="*/ 620065 w 698555"/>
+                <a:gd name="connsiteY2" fmla="*/ 43169 h 482709"/>
+                <a:gd name="connsiteX3" fmla="*/ 698555 w 698555"/>
+                <a:gd name="connsiteY3" fmla="*/ 310032 h 482709"/>
+                <a:gd name="connsiteX4" fmla="*/ 510180 w 698555"/>
+                <a:gd name="connsiteY4" fmla="*/ 482709 h 482709"/>
+                <a:gd name="connsiteX5" fmla="*/ 0 w 698555"/>
+                <a:gd name="connsiteY5" fmla="*/ 353202 h 482709"/>
+                <a:gd name="connsiteX6" fmla="*/ 78489 w 698555"/>
+                <a:gd name="connsiteY6" fmla="*/ 82414 h 482709"/>
+                <a:gd name="connsiteX0" fmla="*/ 78489 w 698555"/>
+                <a:gd name="connsiteY0" fmla="*/ 39246 h 439541"/>
+                <a:gd name="connsiteX1" fmla="*/ 620065 w 698555"/>
+                <a:gd name="connsiteY1" fmla="*/ 1 h 439541"/>
+                <a:gd name="connsiteX2" fmla="*/ 698555 w 698555"/>
+                <a:gd name="connsiteY2" fmla="*/ 266864 h 439541"/>
+                <a:gd name="connsiteX3" fmla="*/ 510180 w 698555"/>
+                <a:gd name="connsiteY3" fmla="*/ 439541 h 439541"/>
+                <a:gd name="connsiteX4" fmla="*/ 0 w 698555"/>
+                <a:gd name="connsiteY4" fmla="*/ 310034 h 439541"/>
+                <a:gd name="connsiteX5" fmla="*/ 78489 w 698555"/>
+                <a:gd name="connsiteY5" fmla="*/ 39246 h 439541"/>
+                <a:gd name="connsiteX0" fmla="*/ 78489 w 620064"/>
+                <a:gd name="connsiteY0" fmla="*/ 39246 h 439541"/>
+                <a:gd name="connsiteX1" fmla="*/ 620065 w 620064"/>
+                <a:gd name="connsiteY1" fmla="*/ 1 h 439541"/>
+                <a:gd name="connsiteX2" fmla="*/ 510180 w 620064"/>
+                <a:gd name="connsiteY2" fmla="*/ 439541 h 439541"/>
+                <a:gd name="connsiteX3" fmla="*/ 0 w 620064"/>
+                <a:gd name="connsiteY3" fmla="*/ 310034 h 439541"/>
+                <a:gd name="connsiteX4" fmla="*/ 78489 w 620064"/>
+                <a:gd name="connsiteY4" fmla="*/ 39246 h 439541"/>
+              </a:gdLst>
+              <a:ahLst/>
+              <a:cxnLst>
+                <a:cxn ang="0">
+                  <a:pos x="connsiteX0" y="connsiteY0"/>
+                </a:cxn>
+                <a:cxn ang="0">
+                  <a:pos x="connsiteX1" y="connsiteY1"/>
+                </a:cxn>
+                <a:cxn ang="0">
+                  <a:pos x="connsiteX2" y="connsiteY2"/>
+                </a:cxn>
+                <a:cxn ang="0">
+                  <a:pos x="connsiteX3" y="connsiteY3"/>
+                </a:cxn>
+                <a:cxn ang="0">
+                  <a:pos x="connsiteX4" y="connsiteY4"/>
+                </a:cxn>
+              </a:cxnLst>
+              <a:rect l="l" t="t" r="r" b="b"/>
+              <a:pathLst>
+                <a:path w="620064" h="439541">
+                  <a:moveTo>
+                    <a:pt x="78489" y="39246"/>
+                  </a:moveTo>
+                  <a:lnTo>
+                    <a:pt x="620065" y="1"/>
+                  </a:lnTo>
+                  <a:lnTo>
+                    <a:pt x="510180" y="439541"/>
+                  </a:lnTo>
+                  <a:lnTo>
+                    <a:pt x="0" y="310034"/>
+                  </a:lnTo>
+                  <a:lnTo>
+                    <a:pt x="78489" y="39246"/>
+                  </a:lnTo>
+                  <a:close/>
+                </a:path>
+              </a:pathLst>
+            </a:custGeom>
+            <a:solidFill>
+              <a:schemeClr val="tx1">
+                <a:lumMod val="95000"/>
+                <a:lumOff val="5000"/>
+              </a:schemeClr>
+            </a:solidFill>
+            <a:ln w="28575">
+              <a:solidFill>
+                <a:schemeClr val="tx1">
+                  <a:lumMod val="85000"/>
+                  <a:lumOff val="15000"/>
+                </a:schemeClr>
+              </a:solidFill>
+            </a:ln>
+          </p:spPr>
+          <p:style>
+            <a:lnRef idx="2">
+              <a:schemeClr val="accent1">
+                <a:shade val="50000"/>
+              </a:schemeClr>
+            </a:lnRef>
+            <a:fillRef idx="1">
+              <a:schemeClr val="accent1"/>
+            </a:fillRef>
+            <a:effectRef idx="0">
+              <a:schemeClr val="accent1"/>
+            </a:effectRef>
+            <a:fontRef idx="minor">
+              <a:schemeClr val="lt1"/>
+            </a:fontRef>
+          </p:style>
+          <p:txBody>
+            <a:bodyPr rtlCol="0" anchor="ctr"/>
+            <a:lstStyle/>
+            <a:p>
+              <a:pPr algn="ctr"/>
+              <a:endParaRPr lang="en-US"/>
+            </a:p>
+          </p:txBody>
+        </p:sp>
+        <p:sp>
+          <p:nvSpPr>
+            <p:cNvPr id="79" name="Freeform 78"/>
+            <p:cNvSpPr/>
+            <p:nvPr/>
+          </p:nvSpPr>
+          <p:spPr>
+            <a:xfrm rot="3412310">
+              <a:off x="9147456" y="3186495"/>
+              <a:ext cx="77762" cy="55122"/>
+            </a:xfrm>
+            <a:custGeom>
+              <a:avLst/>
+              <a:gdLst>
+                <a:gd name="connsiteX0" fmla="*/ 78489 w 698555"/>
+                <a:gd name="connsiteY0" fmla="*/ 82414 h 482709"/>
+                <a:gd name="connsiteX1" fmla="*/ 290410 w 698555"/>
+                <a:gd name="connsiteY1" fmla="*/ 0 h 482709"/>
+                <a:gd name="connsiteX2" fmla="*/ 620065 w 698555"/>
+                <a:gd name="connsiteY2" fmla="*/ 43169 h 482709"/>
+                <a:gd name="connsiteX3" fmla="*/ 698555 w 698555"/>
+                <a:gd name="connsiteY3" fmla="*/ 310032 h 482709"/>
+                <a:gd name="connsiteX4" fmla="*/ 510180 w 698555"/>
+                <a:gd name="connsiteY4" fmla="*/ 482709 h 482709"/>
+                <a:gd name="connsiteX5" fmla="*/ 0 w 698555"/>
+                <a:gd name="connsiteY5" fmla="*/ 353202 h 482709"/>
+                <a:gd name="connsiteX6" fmla="*/ 51018 w 698555"/>
+                <a:gd name="connsiteY6" fmla="*/ 306108 h 482709"/>
+                <a:gd name="connsiteX7" fmla="*/ 78489 w 698555"/>
+                <a:gd name="connsiteY7" fmla="*/ 82414 h 482709"/>
+                <a:gd name="connsiteX0" fmla="*/ 78489 w 698555"/>
+                <a:gd name="connsiteY0" fmla="*/ 82414 h 482709"/>
+                <a:gd name="connsiteX1" fmla="*/ 290410 w 698555"/>
+                <a:gd name="connsiteY1" fmla="*/ 0 h 482709"/>
+                <a:gd name="connsiteX2" fmla="*/ 620065 w 698555"/>
+                <a:gd name="connsiteY2" fmla="*/ 43169 h 482709"/>
+                <a:gd name="connsiteX3" fmla="*/ 698555 w 698555"/>
+                <a:gd name="connsiteY3" fmla="*/ 310032 h 482709"/>
+                <a:gd name="connsiteX4" fmla="*/ 510180 w 698555"/>
+                <a:gd name="connsiteY4" fmla="*/ 482709 h 482709"/>
+                <a:gd name="connsiteX5" fmla="*/ 0 w 698555"/>
+                <a:gd name="connsiteY5" fmla="*/ 353202 h 482709"/>
+                <a:gd name="connsiteX6" fmla="*/ 78489 w 698555"/>
+                <a:gd name="connsiteY6" fmla="*/ 82414 h 482709"/>
+                <a:gd name="connsiteX0" fmla="*/ 78489 w 698555"/>
+                <a:gd name="connsiteY0" fmla="*/ 39246 h 439541"/>
+                <a:gd name="connsiteX1" fmla="*/ 620065 w 698555"/>
+                <a:gd name="connsiteY1" fmla="*/ 1 h 439541"/>
+                <a:gd name="connsiteX2" fmla="*/ 698555 w 698555"/>
+                <a:gd name="connsiteY2" fmla="*/ 266864 h 439541"/>
+                <a:gd name="connsiteX3" fmla="*/ 510180 w 698555"/>
+                <a:gd name="connsiteY3" fmla="*/ 439541 h 439541"/>
+                <a:gd name="connsiteX4" fmla="*/ 0 w 698555"/>
+                <a:gd name="connsiteY4" fmla="*/ 310034 h 439541"/>
+                <a:gd name="connsiteX5" fmla="*/ 78489 w 698555"/>
+                <a:gd name="connsiteY5" fmla="*/ 39246 h 439541"/>
+                <a:gd name="connsiteX0" fmla="*/ 78489 w 620064"/>
+                <a:gd name="connsiteY0" fmla="*/ 39246 h 439541"/>
+                <a:gd name="connsiteX1" fmla="*/ 620065 w 620064"/>
+                <a:gd name="connsiteY1" fmla="*/ 1 h 439541"/>
+                <a:gd name="connsiteX2" fmla="*/ 510180 w 620064"/>
+                <a:gd name="connsiteY2" fmla="*/ 439541 h 439541"/>
+                <a:gd name="connsiteX3" fmla="*/ 0 w 620064"/>
+                <a:gd name="connsiteY3" fmla="*/ 310034 h 439541"/>
+                <a:gd name="connsiteX4" fmla="*/ 78489 w 620064"/>
+                <a:gd name="connsiteY4" fmla="*/ 39246 h 439541"/>
+              </a:gdLst>
+              <a:ahLst/>
+              <a:cxnLst>
+                <a:cxn ang="0">
+                  <a:pos x="connsiteX0" y="connsiteY0"/>
+                </a:cxn>
+                <a:cxn ang="0">
+                  <a:pos x="connsiteX1" y="connsiteY1"/>
+                </a:cxn>
+                <a:cxn ang="0">
+                  <a:pos x="connsiteX2" y="connsiteY2"/>
+                </a:cxn>
+                <a:cxn ang="0">
+                  <a:pos x="connsiteX3" y="connsiteY3"/>
+                </a:cxn>
+                <a:cxn ang="0">
+                  <a:pos x="connsiteX4" y="connsiteY4"/>
+                </a:cxn>
+              </a:cxnLst>
+              <a:rect l="l" t="t" r="r" b="b"/>
+              <a:pathLst>
+                <a:path w="620064" h="439541">
+                  <a:moveTo>
+                    <a:pt x="78489" y="39246"/>
+                  </a:moveTo>
+                  <a:lnTo>
+                    <a:pt x="620065" y="1"/>
+                  </a:lnTo>
+                  <a:lnTo>
+                    <a:pt x="510180" y="439541"/>
+                  </a:lnTo>
+                  <a:lnTo>
+                    <a:pt x="0" y="310034"/>
+                  </a:lnTo>
+                  <a:lnTo>
+                    <a:pt x="78489" y="39246"/>
+                  </a:lnTo>
+                  <a:close/>
+                </a:path>
+              </a:pathLst>
+            </a:custGeom>
+            <a:solidFill>
+              <a:schemeClr val="tx1">
+                <a:lumMod val="95000"/>
+                <a:lumOff val="5000"/>
+              </a:schemeClr>
+            </a:solidFill>
+            <a:ln w="28575">
+              <a:solidFill>
+                <a:schemeClr val="tx1">
+                  <a:lumMod val="85000"/>
+                  <a:lumOff val="15000"/>
+                </a:schemeClr>
+              </a:solidFill>
+            </a:ln>
+          </p:spPr>
+          <p:style>
+            <a:lnRef idx="2">
+              <a:schemeClr val="accent1">
+                <a:shade val="50000"/>
+              </a:schemeClr>
+            </a:lnRef>
+            <a:fillRef idx="1">
+              <a:schemeClr val="accent1"/>
+            </a:fillRef>
+            <a:effectRef idx="0">
+              <a:schemeClr val="accent1"/>
+            </a:effectRef>
+            <a:fontRef idx="minor">
+              <a:schemeClr val="lt1"/>
+            </a:fontRef>
+          </p:style>
+          <p:txBody>
+            <a:bodyPr rtlCol="0" anchor="ctr"/>
+            <a:lstStyle/>
+            <a:p>
+              <a:pPr algn="ctr"/>
+              <a:endParaRPr lang="en-US"/>
+            </a:p>
+          </p:txBody>
+        </p:sp>
+      </p:grpSp>
     </p:spTree>
     <p:extLst>
       <p:ext uri="{BB962C8B-B14F-4D97-AF65-F5344CB8AC3E}">

</xml_diff>